<commit_message>
updated encoding trial figure
</commit_message>
<xml_diff>
--- a/figs/encoding-trial-overview.pptx
+++ b/figs/encoding-trial-overview.pptx
@@ -3720,685 +3720,242 @@
           <a:chExt cx="0" cy="0"/>
         </a:xfrm>
       </p:grpSpPr>
+      <p:cxnSp>
+        <p:nvCxnSpPr>
+          <p:cNvPr id="26" name="Straight Arrow Connector 25"/>
+          <p:cNvCxnSpPr>
+            <a:cxnSpLocks noChangeAspect="1"/>
+          </p:cNvCxnSpPr>
+          <p:nvPr/>
+        </p:nvCxnSpPr>
+        <p:spPr>
+          <a:xfrm>
+            <a:off x="728328" y="2462560"/>
+            <a:ext cx="4073136" cy="2181911"/>
+          </a:xfrm>
+          <a:prstGeom prst="straightConnector1">
+            <a:avLst/>
+          </a:prstGeom>
+          <a:ln w="50800">
+            <a:solidFill>
+              <a:schemeClr val="accent1"/>
+            </a:solidFill>
+            <a:tailEnd type="arrow"/>
+          </a:ln>
+        </p:spPr>
+        <p:style>
+          <a:lnRef idx="2">
+            <a:schemeClr val="accent1"/>
+          </a:lnRef>
+          <a:fillRef idx="0">
+            <a:schemeClr val="accent1"/>
+          </a:fillRef>
+          <a:effectRef idx="1">
+            <a:schemeClr val="accent1"/>
+          </a:effectRef>
+          <a:fontRef idx="minor">
+            <a:schemeClr val="tx1"/>
+          </a:fontRef>
+        </p:style>
+      </p:cxnSp>
       <p:grpSp>
         <p:nvGrpSpPr>
-          <p:cNvPr id="3" name="Group 2"/>
-          <p:cNvGrpSpPr>
-            <a:grpSpLocks noChangeAspect="1"/>
-          </p:cNvGrpSpPr>
+          <p:cNvPr id="39" name="Group 38"/>
+          <p:cNvGrpSpPr/>
           <p:nvPr/>
         </p:nvGrpSpPr>
         <p:grpSpPr>
           <a:xfrm>
             <a:off x="728328" y="297696"/>
-            <a:ext cx="7611333" cy="4346775"/>
+            <a:ext cx="2060533" cy="2039514"/>
             <a:chOff x="239458" y="390862"/>
-            <a:chExt cx="6760137" cy="3860663"/>
+            <a:chExt cx="1830098" cy="1811429"/>
           </a:xfrm>
         </p:grpSpPr>
-        <p:cxnSp>
-          <p:nvCxnSpPr>
-            <p:cNvPr id="26" name="Straight Arrow Connector 25"/>
-            <p:cNvCxnSpPr>
-              <a:cxnSpLocks noChangeAspect="1"/>
-            </p:cNvCxnSpPr>
-            <p:nvPr/>
-          </p:nvCxnSpPr>
-          <p:spPr>
-            <a:xfrm>
-              <a:off x="239458" y="2313623"/>
-              <a:ext cx="3617626" cy="1937902"/>
-            </a:xfrm>
-            <a:prstGeom prst="straightConnector1">
-              <a:avLst/>
-            </a:prstGeom>
-            <a:ln w="50800">
-              <a:solidFill>
-                <a:schemeClr val="accent1"/>
-              </a:solidFill>
-              <a:tailEnd type="arrow"/>
-            </a:ln>
-          </p:spPr>
-          <p:style>
-            <a:lnRef idx="2">
-              <a:schemeClr val="accent1"/>
-            </a:lnRef>
-            <a:fillRef idx="0">
-              <a:schemeClr val="accent1"/>
-            </a:fillRef>
-            <a:effectRef idx="1">
-              <a:schemeClr val="accent1"/>
-            </a:effectRef>
-            <a:fontRef idx="minor">
-              <a:schemeClr val="tx1"/>
-            </a:fontRef>
-          </p:style>
-        </p:cxnSp>
         <p:grpSp>
           <p:nvGrpSpPr>
-            <p:cNvPr id="39" name="Group 38"/>
-            <p:cNvGrpSpPr/>
+            <p:cNvPr id="4" name="Group 3"/>
+            <p:cNvGrpSpPr>
+              <a:grpSpLocks noChangeAspect="1"/>
+            </p:cNvGrpSpPr>
             <p:nvPr/>
           </p:nvGrpSpPr>
           <p:grpSpPr>
             <a:xfrm>
               <a:off x="239458" y="390862"/>
-              <a:ext cx="1830098" cy="1847519"/>
-              <a:chOff x="239458" y="390862"/>
-              <a:chExt cx="1830098" cy="1847519"/>
+              <a:ext cx="1830098" cy="1573778"/>
+              <a:chOff x="2518875" y="1451725"/>
+              <a:chExt cx="4509000" cy="3288000"/>
             </a:xfrm>
           </p:grpSpPr>
-          <p:grpSp>
-            <p:nvGrpSpPr>
-              <p:cNvPr id="4" name="Group 3"/>
-              <p:cNvGrpSpPr>
-                <a:grpSpLocks noChangeAspect="1"/>
-              </p:cNvGrpSpPr>
-              <p:nvPr/>
-            </p:nvGrpSpPr>
-            <p:grpSpPr>
-              <a:xfrm>
-                <a:off x="239458" y="390862"/>
-                <a:ext cx="1830098" cy="1573778"/>
-                <a:chOff x="2518875" y="1451725"/>
-                <a:chExt cx="4509000" cy="3288000"/>
-              </a:xfrm>
-            </p:grpSpPr>
-            <p:sp>
-              <p:nvSpPr>
-                <p:cNvPr id="5" name="Shape 159"/>
-                <p:cNvSpPr/>
-                <p:nvPr/>
-              </p:nvSpPr>
-              <p:spPr>
-                <a:xfrm>
-                  <a:off x="2518875" y="1451725"/>
-                  <a:ext cx="4509000" cy="3288000"/>
-                </a:xfrm>
-                <a:prstGeom prst="rect">
-                  <a:avLst/>
-                </a:prstGeom>
-                <a:solidFill>
-                  <a:schemeClr val="lt2"/>
-                </a:solidFill>
-                <a:ln w="9525" cap="flat" cmpd="sng">
-                  <a:solidFill>
-                    <a:schemeClr val="dk2"/>
-                  </a:solidFill>
-                  <a:prstDash val="solid"/>
-                  <a:round/>
-                  <a:headEnd type="none" w="med" len="med"/>
-                  <a:tailEnd type="none" w="med" len="med"/>
-                </a:ln>
-              </p:spPr>
-              <p:txBody>
-                <a:bodyPr spcFirstLastPara="1" wrap="square" lIns="91425" tIns="91425" rIns="91425" bIns="91425" anchor="ctr" anchorCtr="0">
-                  <a:noAutofit/>
-                </a:bodyPr>
-                <a:lstStyle/>
-                <a:p>
-                  <a:pPr marL="0" lvl="0" indent="0">
-                    <a:spcBef>
-                      <a:spcPts val="0"/>
-                    </a:spcBef>
-                    <a:spcAft>
-                      <a:spcPts val="0"/>
-                    </a:spcAft>
-                    <a:buNone/>
-                  </a:pPr>
-                  <a:endParaRPr sz="800"/>
-                </a:p>
-              </p:txBody>
-            </p:sp>
-            <p:sp>
-              <p:nvSpPr>
-                <p:cNvPr id="6" name="Shape 160"/>
-                <p:cNvSpPr txBox="1"/>
-                <p:nvPr/>
-              </p:nvSpPr>
-              <p:spPr>
-                <a:xfrm>
-                  <a:off x="3393825" y="2773675"/>
-                  <a:ext cx="2759100" cy="644100"/>
-                </a:xfrm>
-                <a:prstGeom prst="rect">
-                  <a:avLst/>
-                </a:prstGeom>
-                <a:noFill/>
-                <a:ln>
-                  <a:noFill/>
-                </a:ln>
-              </p:spPr>
-              <p:txBody>
-                <a:bodyPr spcFirstLastPara="1" wrap="square" lIns="91425" tIns="91425" rIns="91425" bIns="91425" anchor="t" anchorCtr="0">
-                  <a:noAutofit/>
-                </a:bodyPr>
-                <a:lstStyle/>
-                <a:p>
-                  <a:pPr marL="0" lvl="0" indent="0" algn="ctr">
-                    <a:lnSpc>
-                      <a:spcPct val="115000"/>
-                    </a:lnSpc>
-                    <a:spcBef>
-                      <a:spcPts val="0"/>
-                    </a:spcBef>
-                    <a:spcAft>
-                      <a:spcPts val="0"/>
-                    </a:spcAft>
-                    <a:buNone/>
-                  </a:pPr>
-                  <a:r>
-                    <a:rPr lang="en" sz="700" dirty="0"/>
-                    <a:t>Would this object float?</a:t>
-                  </a:r>
-                  <a:endParaRPr sz="700" dirty="0"/>
-                </a:p>
-                <a:p>
-                  <a:pPr marL="0" lvl="0" indent="0" algn="ctr">
-                    <a:lnSpc>
-                      <a:spcPct val="115000"/>
-                    </a:lnSpc>
-                    <a:spcBef>
-                      <a:spcPts val="0"/>
-                    </a:spcBef>
-                    <a:spcAft>
-                      <a:spcPts val="0"/>
-                    </a:spcAft>
-                    <a:buNone/>
-                  </a:pPr>
-                  <a:r>
-                    <a:rPr lang="en" sz="700" dirty="0"/>
-                    <a:t>1 = yes  |  2 = no</a:t>
-                  </a:r>
-                  <a:endParaRPr sz="700" dirty="0"/>
-                </a:p>
-              </p:txBody>
-            </p:sp>
-          </p:grpSp>
           <p:sp>
             <p:nvSpPr>
-              <p:cNvPr id="29" name="TextBox 28"/>
+              <p:cNvPr id="5" name="Shape 159"/>
+              <p:cNvSpPr/>
+              <p:nvPr/>
+            </p:nvSpPr>
+            <p:spPr>
+              <a:xfrm>
+                <a:off x="2518875" y="1451725"/>
+                <a:ext cx="4509000" cy="3288000"/>
+              </a:xfrm>
+              <a:prstGeom prst="rect">
+                <a:avLst/>
+              </a:prstGeom>
+              <a:solidFill>
+                <a:schemeClr val="lt2"/>
+              </a:solidFill>
+              <a:ln w="9525" cap="flat" cmpd="sng">
+                <a:solidFill>
+                  <a:schemeClr val="dk2"/>
+                </a:solidFill>
+                <a:prstDash val="solid"/>
+                <a:round/>
+                <a:headEnd type="none" w="med" len="med"/>
+                <a:tailEnd type="none" w="med" len="med"/>
+              </a:ln>
+            </p:spPr>
+            <p:txBody>
+              <a:bodyPr spcFirstLastPara="1" wrap="square" lIns="91425" tIns="91425" rIns="91425" bIns="91425" anchor="ctr" anchorCtr="0">
+                <a:noAutofit/>
+              </a:bodyPr>
+              <a:lstStyle/>
+              <a:p>
+                <a:pPr marL="0" lvl="0" indent="0">
+                  <a:spcBef>
+                    <a:spcPts val="0"/>
+                  </a:spcBef>
+                  <a:spcAft>
+                    <a:spcPts val="0"/>
+                  </a:spcAft>
+                  <a:buNone/>
+                </a:pPr>
+                <a:endParaRPr sz="800"/>
+              </a:p>
+            </p:txBody>
+          </p:sp>
+          <p:sp>
+            <p:nvSpPr>
+              <p:cNvPr id="6" name="Shape 160"/>
               <p:cNvSpPr txBox="1"/>
               <p:nvPr/>
             </p:nvSpPr>
             <p:spPr>
               <a:xfrm>
-                <a:off x="857186" y="1976771"/>
-                <a:ext cx="631999" cy="261610"/>
+                <a:off x="3113640" y="1963591"/>
+                <a:ext cx="3282815" cy="644101"/>
               </a:xfrm>
               <a:prstGeom prst="rect">
                 <a:avLst/>
               </a:prstGeom>
               <a:noFill/>
+              <a:ln>
+                <a:noFill/>
+              </a:ln>
             </p:spPr>
             <p:txBody>
-              <a:bodyPr wrap="square" rtlCol="0">
-                <a:spAutoFit/>
+              <a:bodyPr spcFirstLastPara="1" wrap="square" lIns="91425" tIns="91425" rIns="91425" bIns="91425" anchor="t" anchorCtr="0">
+                <a:noAutofit/>
               </a:bodyPr>
               <a:lstStyle/>
               <a:p>
-                <a:pPr algn="ctr"/>
+                <a:pPr marL="0" lvl="0" indent="0" algn="ctr">
+                  <a:lnSpc>
+                    <a:spcPct val="115000"/>
+                  </a:lnSpc>
+                  <a:spcBef>
+                    <a:spcPts val="0"/>
+                  </a:spcBef>
+                  <a:spcAft>
+                    <a:spcPts val="0"/>
+                  </a:spcAft>
+                  <a:buNone/>
+                </a:pPr>
                 <a:r>
-                  <a:rPr lang="en-US" sz="1050" dirty="0" smtClean="0"/>
-                  <a:t>1.5 sec</a:t>
+                  <a:rPr lang="en-US" sz="700" b="1" dirty="0" smtClean="0"/>
+                  <a:t>Reminder: These colors indicate BOMBS or SAFETY!</a:t>
                 </a:r>
-                <a:endParaRPr lang="en-US" sz="1050" dirty="0"/>
+                <a:endParaRPr sz="700" b="1" dirty="0"/>
               </a:p>
             </p:txBody>
           </p:sp>
         </p:grpSp>
+        <p:sp>
+          <p:nvSpPr>
+            <p:cNvPr id="29" name="TextBox 28"/>
+            <p:cNvSpPr txBox="1"/>
+            <p:nvPr/>
+          </p:nvSpPr>
+          <p:spPr>
+            <a:xfrm>
+              <a:off x="857186" y="1976771"/>
+              <a:ext cx="631999" cy="225520"/>
+            </a:xfrm>
+            <a:prstGeom prst="rect">
+              <a:avLst/>
+            </a:prstGeom>
+            <a:noFill/>
+          </p:spPr>
+          <p:txBody>
+            <a:bodyPr wrap="square" rtlCol="0">
+              <a:spAutoFit/>
+            </a:bodyPr>
+            <a:lstStyle/>
+            <a:p>
+              <a:pPr algn="ctr"/>
+              <a:r>
+                <a:rPr lang="en-US" sz="1050" dirty="0" smtClean="0"/>
+                <a:t>4 </a:t>
+              </a:r>
+              <a:r>
+                <a:rPr lang="en-US" sz="1050" dirty="0" smtClean="0"/>
+                <a:t>sec</a:t>
+              </a:r>
+              <a:endParaRPr lang="en-US" sz="1050" dirty="0"/>
+            </a:p>
+          </p:txBody>
+        </p:sp>
+      </p:grpSp>
+      <p:grpSp>
+        <p:nvGrpSpPr>
+          <p:cNvPr id="38" name="Group 37"/>
+          <p:cNvGrpSpPr/>
+          <p:nvPr/>
+        </p:nvGrpSpPr>
+        <p:grpSpPr>
+          <a:xfrm>
+            <a:off x="2389024" y="1183665"/>
+            <a:ext cx="2060534" cy="2026948"/>
+            <a:chOff x="1714434" y="1177751"/>
+            <a:chExt cx="1830099" cy="1800268"/>
+          </a:xfrm>
+        </p:grpSpPr>
         <p:grpSp>
           <p:nvGrpSpPr>
-            <p:cNvPr id="38" name="Group 37"/>
-            <p:cNvGrpSpPr/>
+            <p:cNvPr id="7" name="Group 6"/>
+            <p:cNvGrpSpPr>
+              <a:grpSpLocks noChangeAspect="1"/>
+            </p:cNvGrpSpPr>
             <p:nvPr/>
           </p:nvGrpSpPr>
           <p:grpSpPr>
             <a:xfrm>
               <a:off x="1714434" y="1177751"/>
-              <a:ext cx="1830099" cy="1828665"/>
-              <a:chOff x="1714434" y="1177751"/>
-              <a:chExt cx="1830099" cy="1828665"/>
+              <a:ext cx="1830099" cy="1573778"/>
+              <a:chOff x="2317500" y="1451725"/>
+              <a:chExt cx="4509000" cy="3288000"/>
             </a:xfrm>
           </p:grpSpPr>
-          <p:grpSp>
-            <p:nvGrpSpPr>
-              <p:cNvPr id="7" name="Group 6"/>
-              <p:cNvGrpSpPr>
-                <a:grpSpLocks noChangeAspect="1"/>
-              </p:cNvGrpSpPr>
-              <p:nvPr/>
-            </p:nvGrpSpPr>
-            <p:grpSpPr>
-              <a:xfrm>
-                <a:off x="1714434" y="1177751"/>
-                <a:ext cx="1830099" cy="1573778"/>
-                <a:chOff x="2317500" y="1451725"/>
-                <a:chExt cx="4509000" cy="3288000"/>
-              </a:xfrm>
-            </p:grpSpPr>
-            <p:sp>
-              <p:nvSpPr>
-                <p:cNvPr id="8" name="Shape 166"/>
-                <p:cNvSpPr/>
-                <p:nvPr/>
-              </p:nvSpPr>
-              <p:spPr>
-                <a:xfrm>
-                  <a:off x="2317500" y="1451725"/>
-                  <a:ext cx="4509000" cy="3288000"/>
-                </a:xfrm>
-                <a:prstGeom prst="rect">
-                  <a:avLst/>
-                </a:prstGeom>
-                <a:solidFill>
-                  <a:schemeClr val="lt2"/>
-                </a:solidFill>
-                <a:ln w="9525" cap="flat" cmpd="sng">
-                  <a:solidFill>
-                    <a:schemeClr val="dk2"/>
-                  </a:solidFill>
-                  <a:prstDash val="solid"/>
-                  <a:round/>
-                  <a:headEnd type="none" w="med" len="med"/>
-                  <a:tailEnd type="none" w="med" len="med"/>
-                </a:ln>
-              </p:spPr>
-              <p:txBody>
-                <a:bodyPr spcFirstLastPara="1" wrap="square" lIns="91425" tIns="91425" rIns="91425" bIns="91425" anchor="ctr" anchorCtr="0">
-                  <a:noAutofit/>
-                </a:bodyPr>
-                <a:lstStyle/>
-                <a:p>
-                  <a:pPr marL="0" lvl="0" indent="0" rtl="0">
-                    <a:spcBef>
-                      <a:spcPts val="0"/>
-                    </a:spcBef>
-                    <a:spcAft>
-                      <a:spcPts val="0"/>
-                    </a:spcAft>
-                    <a:buNone/>
-                  </a:pPr>
-                  <a:endParaRPr sz="800"/>
-                </a:p>
-              </p:txBody>
-            </p:sp>
-            <p:pic>
-              <p:nvPicPr>
-                <p:cNvPr id="9" name="Shape 167" descr="context_004.jpg"/>
-                <p:cNvPicPr preferRelativeResize="0"/>
-                <p:nvPr/>
-              </p:nvPicPr>
-              <p:blipFill>
-                <a:blip r:embed="rId2">
-                  <a:alphaModFix/>
-                </a:blip>
-                <a:stretch>
-                  <a:fillRect/>
-                </a:stretch>
-              </p:blipFill>
-              <p:spPr>
-                <a:xfrm>
-                  <a:off x="3464963" y="2200913"/>
-                  <a:ext cx="2214073" cy="1789620"/>
-                </a:xfrm>
-                <a:prstGeom prst="rect">
-                  <a:avLst/>
-                </a:prstGeom>
-                <a:noFill/>
-                <a:ln>
-                  <a:noFill/>
-                </a:ln>
-              </p:spPr>
-            </p:pic>
-          </p:grpSp>
           <p:sp>
             <p:nvSpPr>
-              <p:cNvPr id="30" name="TextBox 29"/>
-              <p:cNvSpPr txBox="1"/>
-              <p:nvPr/>
-            </p:nvSpPr>
-            <p:spPr>
-              <a:xfrm>
-                <a:off x="2069556" y="2752500"/>
-                <a:ext cx="1065757" cy="253916"/>
-              </a:xfrm>
-              <a:prstGeom prst="rect">
-                <a:avLst/>
-              </a:prstGeom>
-              <a:noFill/>
-            </p:spPr>
-            <p:txBody>
-              <a:bodyPr wrap="square" rtlCol="0">
-                <a:spAutoFit/>
-              </a:bodyPr>
-              <a:lstStyle/>
-              <a:p>
-                <a:pPr algn="ctr"/>
-                <a:r>
-                  <a:rPr lang="en-US" sz="1050" dirty="0" smtClean="0"/>
-                  <a:t>[2, 4, 6, 8] sec</a:t>
-                </a:r>
-                <a:endParaRPr lang="en-US" sz="1050" dirty="0"/>
-              </a:p>
-            </p:txBody>
-          </p:sp>
-        </p:grpSp>
-        <p:grpSp>
-          <p:nvGrpSpPr>
-            <p:cNvPr id="37" name="Group 36"/>
-            <p:cNvGrpSpPr/>
-            <p:nvPr/>
-          </p:nvGrpSpPr>
-          <p:grpSpPr>
-            <a:xfrm>
-              <a:off x="3210201" y="1848133"/>
-              <a:ext cx="1825440" cy="1823498"/>
-              <a:chOff x="3078803" y="1848133"/>
-              <a:chExt cx="1825440" cy="1823498"/>
-            </a:xfrm>
-          </p:grpSpPr>
-          <p:grpSp>
-            <p:nvGrpSpPr>
-              <p:cNvPr id="10" name="Group 9"/>
-              <p:cNvGrpSpPr>
-                <a:grpSpLocks noChangeAspect="1"/>
-              </p:cNvGrpSpPr>
-              <p:nvPr/>
-            </p:nvGrpSpPr>
-            <p:grpSpPr>
-              <a:xfrm>
-                <a:off x="3078803" y="1848133"/>
-                <a:ext cx="1825440" cy="1569772"/>
-                <a:chOff x="2317500" y="1442100"/>
-                <a:chExt cx="4509000" cy="3288000"/>
-              </a:xfrm>
-            </p:grpSpPr>
-            <p:sp>
-              <p:nvSpPr>
-                <p:cNvPr id="11" name="Shape 173"/>
-                <p:cNvSpPr/>
-                <p:nvPr/>
-              </p:nvSpPr>
-              <p:spPr>
-                <a:xfrm>
-                  <a:off x="2317500" y="1442100"/>
-                  <a:ext cx="4509000" cy="3288000"/>
-                </a:xfrm>
-                <a:prstGeom prst="rect">
-                  <a:avLst/>
-                </a:prstGeom>
-                <a:solidFill>
-                  <a:schemeClr val="lt2"/>
-                </a:solidFill>
-                <a:ln w="9525" cap="flat" cmpd="sng">
-                  <a:solidFill>
-                    <a:schemeClr val="dk2"/>
-                  </a:solidFill>
-                  <a:prstDash val="solid"/>
-                  <a:round/>
-                  <a:headEnd type="none" w="med" len="med"/>
-                  <a:tailEnd type="none" w="med" len="med"/>
-                </a:ln>
-              </p:spPr>
-              <p:txBody>
-                <a:bodyPr spcFirstLastPara="1" wrap="square" lIns="91425" tIns="91425" rIns="91425" bIns="91425" anchor="ctr" anchorCtr="0">
-                  <a:noAutofit/>
-                </a:bodyPr>
-                <a:lstStyle/>
-                <a:p>
-                  <a:pPr marL="0" lvl="0" indent="0" rtl="0">
-                    <a:spcBef>
-                      <a:spcPts val="0"/>
-                    </a:spcBef>
-                    <a:spcAft>
-                      <a:spcPts val="0"/>
-                    </a:spcAft>
-                    <a:buNone/>
-                  </a:pPr>
-                  <a:endParaRPr sz="800"/>
-                </a:p>
-              </p:txBody>
-            </p:sp>
-            <p:pic>
-              <p:nvPicPr>
-                <p:cNvPr id="12" name="Shape 174" descr="context_004.jpg"/>
-                <p:cNvPicPr preferRelativeResize="0"/>
-                <p:nvPr/>
-              </p:nvPicPr>
-              <p:blipFill>
-                <a:blip r:embed="rId2">
-                  <a:alphaModFix/>
-                </a:blip>
-                <a:stretch>
-                  <a:fillRect/>
-                </a:stretch>
-              </p:blipFill>
-              <p:spPr>
-                <a:xfrm>
-                  <a:off x="3464963" y="2191288"/>
-                  <a:ext cx="2214073" cy="1789620"/>
-                </a:xfrm>
-                <a:prstGeom prst="rect">
-                  <a:avLst/>
-                </a:prstGeom>
-                <a:noFill/>
-                <a:ln>
-                  <a:noFill/>
-                </a:ln>
-              </p:spPr>
-            </p:pic>
-            <p:pic>
-              <p:nvPicPr>
-                <p:cNvPr id="13" name="Shape 175" descr="item_004.jpg"/>
-                <p:cNvPicPr preferRelativeResize="0"/>
-                <p:nvPr/>
-              </p:nvPicPr>
-              <p:blipFill>
-                <a:blip r:embed="rId3">
-                  <a:alphaModFix/>
-                </a:blip>
-                <a:stretch>
-                  <a:fillRect/>
-                </a:stretch>
-              </p:blipFill>
-              <p:spPr>
-                <a:xfrm>
-                  <a:off x="4247440" y="2761538"/>
-                  <a:ext cx="649125" cy="649125"/>
-                </a:xfrm>
-                <a:prstGeom prst="rect">
-                  <a:avLst/>
-                </a:prstGeom>
-                <a:noFill/>
-                <a:ln>
-                  <a:noFill/>
-                </a:ln>
-              </p:spPr>
-            </p:pic>
-            <p:sp>
-              <p:nvSpPr>
-                <p:cNvPr id="14" name="Shape 176"/>
-                <p:cNvSpPr txBox="1"/>
-                <p:nvPr/>
-              </p:nvSpPr>
-              <p:spPr>
-                <a:xfrm>
-                  <a:off x="3596150" y="4191700"/>
-                  <a:ext cx="1980600" cy="278700"/>
-                </a:xfrm>
-                <a:prstGeom prst="rect">
-                  <a:avLst/>
-                </a:prstGeom>
-                <a:noFill/>
-                <a:ln>
-                  <a:noFill/>
-                </a:ln>
-              </p:spPr>
-              <p:txBody>
-                <a:bodyPr spcFirstLastPara="1" wrap="square" lIns="91425" tIns="91425" rIns="91425" bIns="91425" anchor="t" anchorCtr="0">
-                  <a:noAutofit/>
-                </a:bodyPr>
-                <a:lstStyle/>
-                <a:p>
-                  <a:pPr marL="0" lvl="0" indent="0" algn="ctr">
-                    <a:spcBef>
-                      <a:spcPts val="0"/>
-                    </a:spcBef>
-                    <a:spcAft>
-                      <a:spcPts val="0"/>
-                    </a:spcAft>
-                    <a:buNone/>
-                  </a:pPr>
-                  <a:r>
-                    <a:rPr lang="en" sz="600" dirty="0"/>
-                    <a:t>1 = yes   |   2 = no</a:t>
-                  </a:r>
-                  <a:endParaRPr sz="600" dirty="0"/>
-                </a:p>
-                <a:p>
-                  <a:pPr marL="0" lvl="0" indent="0" algn="ctr">
-                    <a:spcBef>
-                      <a:spcPts val="0"/>
-                    </a:spcBef>
-                    <a:spcAft>
-                      <a:spcPts val="0"/>
-                    </a:spcAft>
-                    <a:buNone/>
-                  </a:pPr>
-                  <a:endParaRPr sz="700" dirty="0"/>
-                </a:p>
-              </p:txBody>
-            </p:sp>
-          </p:grpSp>
-          <p:sp>
-            <p:nvSpPr>
-              <p:cNvPr id="31" name="TextBox 30"/>
-              <p:cNvSpPr txBox="1"/>
-              <p:nvPr/>
-            </p:nvSpPr>
-            <p:spPr>
-              <a:xfrm>
-                <a:off x="3659189" y="3417715"/>
-                <a:ext cx="642936" cy="253916"/>
-              </a:xfrm>
-              <a:prstGeom prst="rect">
-                <a:avLst/>
-              </a:prstGeom>
-              <a:noFill/>
-            </p:spPr>
-            <p:txBody>
-              <a:bodyPr wrap="square" rtlCol="0">
-                <a:spAutoFit/>
-              </a:bodyPr>
-              <a:lstStyle/>
-              <a:p>
-                <a:pPr algn="ctr"/>
-                <a:r>
-                  <a:rPr lang="en-US" sz="1050" dirty="0" smtClean="0"/>
-                  <a:t>2 sec</a:t>
-                </a:r>
-                <a:endParaRPr lang="en-US" sz="1050" dirty="0"/>
-              </a:p>
-            </p:txBody>
-          </p:sp>
-        </p:grpSp>
-        <p:grpSp>
-          <p:nvGrpSpPr>
-            <p:cNvPr id="2" name="Group 1"/>
-            <p:cNvGrpSpPr/>
-            <p:nvPr/>
-          </p:nvGrpSpPr>
-          <p:grpSpPr>
-            <a:xfrm>
-              <a:off x="4743361" y="1660480"/>
-              <a:ext cx="1806169" cy="2591045"/>
-              <a:chOff x="4743361" y="1660480"/>
-              <a:chExt cx="1806169" cy="2591045"/>
-            </a:xfrm>
-          </p:grpSpPr>
-          <p:grpSp>
-            <p:nvGrpSpPr>
-              <p:cNvPr id="35" name="Group 34"/>
-              <p:cNvGrpSpPr/>
-              <p:nvPr/>
-            </p:nvGrpSpPr>
-            <p:grpSpPr>
-              <a:xfrm>
-                <a:off x="5144810" y="1660480"/>
-                <a:ext cx="1089803" cy="632582"/>
-                <a:chOff x="6395260" y="1936988"/>
-                <a:chExt cx="1089803" cy="632582"/>
-              </a:xfrm>
-            </p:grpSpPr>
-            <p:pic>
-              <p:nvPicPr>
-                <p:cNvPr id="20" name="Shape 186"/>
-                <p:cNvPicPr preferRelativeResize="0"/>
-                <p:nvPr/>
-              </p:nvPicPr>
-              <p:blipFill rotWithShape="1">
-                <a:blip r:embed="rId4">
-                  <a:alphaModFix/>
-                </a:blip>
-                <a:srcRect t="4598" r="6933"/>
-                <a:stretch/>
-              </p:blipFill>
-              <p:spPr>
-                <a:xfrm>
-                  <a:off x="6395260" y="1936988"/>
-                  <a:ext cx="654071" cy="632582"/>
-                </a:xfrm>
-                <a:prstGeom prst="rect">
-                  <a:avLst/>
-                </a:prstGeom>
-                <a:noFill/>
-                <a:ln>
-                  <a:noFill/>
-                </a:ln>
-              </p:spPr>
-            </p:pic>
-            <p:sp>
-              <p:nvSpPr>
-                <p:cNvPr id="22" name="TextBox 21"/>
-                <p:cNvSpPr txBox="1"/>
-                <p:nvPr/>
-              </p:nvSpPr>
-              <p:spPr>
-                <a:xfrm>
-                  <a:off x="6983966" y="2232217"/>
-                  <a:ext cx="501097" cy="261610"/>
-                </a:xfrm>
-                <a:prstGeom prst="rect">
-                  <a:avLst/>
-                </a:prstGeom>
-                <a:noFill/>
-              </p:spPr>
-              <p:txBody>
-                <a:bodyPr wrap="square" rtlCol="0">
-                  <a:spAutoFit/>
-                </a:bodyPr>
-                <a:lstStyle/>
-                <a:p>
-                  <a:r>
-                    <a:rPr lang="en-US" sz="1050" dirty="0" smtClean="0"/>
-                    <a:t>25%</a:t>
-                  </a:r>
-                  <a:endParaRPr lang="en-US" sz="1050" dirty="0"/>
-                </a:p>
-              </p:txBody>
-            </p:sp>
-          </p:grpSp>
-          <p:sp>
-            <p:nvSpPr>
-              <p:cNvPr id="16" name="Shape 182"/>
+              <p:cNvPr id="8" name="Shape 166"/>
               <p:cNvSpPr/>
               <p:nvPr/>
             </p:nvSpPr>
             <p:spPr>
               <a:xfrm>
-                <a:off x="4743361" y="2436715"/>
-                <a:ext cx="1806169" cy="1553200"/>
+                <a:off x="2317500" y="1451725"/>
+                <a:ext cx="4509000" cy="3288000"/>
               </a:xfrm>
               <a:prstGeom prst="rect">
                 <a:avLst/>
@@ -4437,7 +3994,7 @@
           </p:sp>
           <p:pic>
             <p:nvPicPr>
-              <p:cNvPr id="17" name="Shape 183" descr="context_004.jpg"/>
+              <p:cNvPr id="9" name="Shape 167" descr="context_004.jpg"/>
               <p:cNvPicPr preferRelativeResize="0"/>
               <p:nvPr/>
             </p:nvPicPr>
@@ -4451,131 +4008,31 @@
             </p:blipFill>
             <p:spPr>
               <a:xfrm>
-                <a:off x="5203000" y="2790620"/>
-                <a:ext cx="886891" cy="845389"/>
+                <a:off x="3464963" y="2200913"/>
+                <a:ext cx="2214073" cy="1789620"/>
               </a:xfrm>
               <a:prstGeom prst="rect">
                 <a:avLst/>
               </a:prstGeom>
               <a:noFill/>
-              <a:ln>
-                <a:noFill/>
+              <a:ln w="38100" cmpd="sng">
+                <a:solidFill>
+                  <a:srgbClr val="31EBFF"/>
+                </a:solidFill>
               </a:ln>
             </p:spPr>
           </p:pic>
-          <p:sp>
-            <p:nvSpPr>
-              <p:cNvPr id="18" name="Shape 184"/>
-              <p:cNvSpPr/>
-              <p:nvPr/>
-            </p:nvSpPr>
-            <p:spPr>
-              <a:xfrm>
-                <a:off x="5490469" y="3024840"/>
-                <a:ext cx="311964" cy="376963"/>
-              </a:xfrm>
-              <a:prstGeom prst="rect">
-                <a:avLst/>
-              </a:prstGeom>
-              <a:solidFill>
-                <a:schemeClr val="accent5">
-                  <a:lumMod val="60000"/>
-                  <a:lumOff val="40000"/>
-                </a:schemeClr>
-              </a:solidFill>
-              <a:ln>
-                <a:noFill/>
-              </a:ln>
-            </p:spPr>
-            <p:txBody>
-              <a:bodyPr spcFirstLastPara="1" wrap="square" lIns="91425" tIns="91425" rIns="91425" bIns="91425" anchor="ctr" anchorCtr="0">
-                <a:noAutofit/>
-              </a:bodyPr>
-              <a:lstStyle/>
-              <a:p>
-                <a:pPr marL="0" lvl="0" indent="0">
-                  <a:spcBef>
-                    <a:spcPts val="0"/>
-                  </a:spcBef>
-                  <a:spcAft>
-                    <a:spcPts val="0"/>
-                  </a:spcAft>
-                  <a:buNone/>
-                </a:pPr>
-                <a:endParaRPr sz="800"/>
-              </a:p>
-            </p:txBody>
-          </p:sp>
-          <p:pic>
-            <p:nvPicPr>
-              <p:cNvPr id="19" name="Shape 185" descr="item_004.jpg"/>
-              <p:cNvPicPr preferRelativeResize="0"/>
-              <p:nvPr/>
-            </p:nvPicPr>
-            <p:blipFill>
-              <a:blip r:embed="rId3">
-                <a:alphaModFix/>
-              </a:blip>
-              <a:stretch>
-                <a:fillRect/>
-              </a:stretch>
-            </p:blipFill>
-            <p:spPr>
-              <a:xfrm>
-                <a:off x="5516437" y="3059997"/>
-                <a:ext cx="260020" cy="306637"/>
-              </a:xfrm>
-              <a:prstGeom prst="rect">
-                <a:avLst/>
-              </a:prstGeom>
-              <a:noFill/>
-              <a:ln>
-                <a:noFill/>
-              </a:ln>
-            </p:spPr>
-          </p:pic>
-          <p:sp>
-            <p:nvSpPr>
-              <p:cNvPr id="32" name="TextBox 31"/>
-              <p:cNvSpPr txBox="1"/>
-              <p:nvPr/>
-            </p:nvSpPr>
-            <p:spPr>
-              <a:xfrm>
-                <a:off x="5332042" y="3989915"/>
-                <a:ext cx="628050" cy="261610"/>
-              </a:xfrm>
-              <a:prstGeom prst="rect">
-                <a:avLst/>
-              </a:prstGeom>
-              <a:noFill/>
-            </p:spPr>
-            <p:txBody>
-              <a:bodyPr wrap="square" rtlCol="0">
-                <a:spAutoFit/>
-              </a:bodyPr>
-              <a:lstStyle/>
-              <a:p>
-                <a:pPr algn="ctr"/>
-                <a:r>
-                  <a:rPr lang="en-US" sz="1050" dirty="0" smtClean="0"/>
-                  <a:t>1.5 sec</a:t>
-                </a:r>
-                <a:endParaRPr lang="en-US" sz="1050" dirty="0"/>
-              </a:p>
-            </p:txBody>
-          </p:sp>
         </p:grpSp>
         <p:sp>
           <p:nvSpPr>
-            <p:cNvPr id="34" name="TextBox 33"/>
+            <p:cNvPr id="30" name="TextBox 29"/>
             <p:cNvSpPr txBox="1"/>
             <p:nvPr/>
           </p:nvSpPr>
           <p:spPr>
-            <a:xfrm rot="1891962">
-              <a:off x="6610657" y="3816290"/>
-              <a:ext cx="388938" cy="400110"/>
+            <a:xfrm>
+              <a:off x="2069556" y="2752499"/>
+              <a:ext cx="1065757" cy="225520"/>
             </a:xfrm>
             <a:prstGeom prst="rect">
               <a:avLst/>
@@ -4583,21 +4040,563 @@
             <a:noFill/>
           </p:spPr>
           <p:txBody>
-            <a:bodyPr wrap="square" rtlCol="0" anchor="ctr">
+            <a:bodyPr wrap="square" rtlCol="0">
               <a:spAutoFit/>
             </a:bodyPr>
             <a:lstStyle/>
             <a:p>
-              <a:pPr algn="dist"/>
+              <a:pPr algn="ctr"/>
               <a:r>
-                <a:rPr lang="is-IS" sz="2000" dirty="0" smtClean="0"/>
-                <a:t>…</a:t>
+                <a:rPr lang="en-US" sz="1050" dirty="0" smtClean="0"/>
+                <a:t>3 sec</a:t>
               </a:r>
-              <a:endParaRPr lang="en-US" sz="2000" dirty="0"/>
+              <a:endParaRPr lang="en-US" sz="1050" dirty="0"/>
             </a:p>
           </p:txBody>
         </p:sp>
       </p:grpSp>
+      <p:sp>
+        <p:nvSpPr>
+          <p:cNvPr id="11" name="Shape 173"/>
+          <p:cNvSpPr/>
+          <p:nvPr/>
+        </p:nvSpPr>
+        <p:spPr>
+          <a:xfrm>
+            <a:off x="4073129" y="1938458"/>
+            <a:ext cx="2055288" cy="1767428"/>
+          </a:xfrm>
+          <a:prstGeom prst="rect">
+            <a:avLst/>
+          </a:prstGeom>
+          <a:solidFill>
+            <a:schemeClr val="lt2"/>
+          </a:solidFill>
+          <a:ln w="9525" cap="flat" cmpd="sng">
+            <a:solidFill>
+              <a:schemeClr val="dk2"/>
+            </a:solidFill>
+            <a:prstDash val="solid"/>
+            <a:round/>
+            <a:headEnd type="none" w="med" len="med"/>
+            <a:tailEnd type="none" w="med" len="med"/>
+          </a:ln>
+        </p:spPr>
+        <p:txBody>
+          <a:bodyPr spcFirstLastPara="1" wrap="square" lIns="91425" tIns="91425" rIns="91425" bIns="91425" anchor="ctr" anchorCtr="0">
+            <a:noAutofit/>
+          </a:bodyPr>
+          <a:lstStyle/>
+          <a:p>
+            <a:pPr marL="0" lvl="0" indent="0" rtl="0">
+              <a:spcBef>
+                <a:spcPts val="0"/>
+              </a:spcBef>
+              <a:spcAft>
+                <a:spcPts val="0"/>
+              </a:spcAft>
+              <a:buNone/>
+            </a:pPr>
+            <a:endParaRPr sz="800"/>
+          </a:p>
+        </p:txBody>
+      </p:sp>
+      <p:pic>
+        <p:nvPicPr>
+          <p:cNvPr id="12" name="Shape 174" descr="context_004.jpg"/>
+          <p:cNvPicPr preferRelativeResize="0"/>
+          <p:nvPr/>
+        </p:nvPicPr>
+        <p:blipFill>
+          <a:blip r:embed="rId2">
+            <a:alphaModFix/>
+          </a:blip>
+          <a:stretch>
+            <a:fillRect/>
+          </a:stretch>
+        </p:blipFill>
+        <p:spPr>
+          <a:xfrm>
+            <a:off x="4596164" y="2341176"/>
+            <a:ext cx="1009217" cy="961990"/>
+          </a:xfrm>
+          <a:prstGeom prst="rect">
+            <a:avLst/>
+          </a:prstGeom>
+          <a:noFill/>
+          <a:ln w="38100" cmpd="sng">
+            <a:solidFill>
+              <a:srgbClr val="31EBFF"/>
+            </a:solidFill>
+          </a:ln>
+        </p:spPr>
+      </p:pic>
+      <p:sp>
+        <p:nvSpPr>
+          <p:cNvPr id="31" name="TextBox 30"/>
+          <p:cNvSpPr txBox="1"/>
+          <p:nvPr/>
+        </p:nvSpPr>
+        <p:spPr>
+          <a:xfrm>
+            <a:off x="4435373" y="3712683"/>
+            <a:ext cx="1241629" cy="253916"/>
+          </a:xfrm>
+          <a:prstGeom prst="rect">
+            <a:avLst/>
+          </a:prstGeom>
+          <a:noFill/>
+        </p:spPr>
+        <p:txBody>
+          <a:bodyPr wrap="square" rtlCol="0">
+            <a:spAutoFit/>
+          </a:bodyPr>
+          <a:lstStyle/>
+          <a:p>
+            <a:pPr algn="ctr"/>
+            <a:r>
+              <a:rPr lang="en-US" sz="1050" dirty="0"/>
+              <a:t>[2, 4, 6, 8] sec</a:t>
+            </a:r>
+            <a:endParaRPr lang="en-US" sz="1050" dirty="0"/>
+          </a:p>
+        </p:txBody>
+      </p:sp>
+      <p:grpSp>
+        <p:nvGrpSpPr>
+          <p:cNvPr id="35" name="Group 34"/>
+          <p:cNvGrpSpPr/>
+          <p:nvPr/>
+        </p:nvGrpSpPr>
+        <p:grpSpPr>
+          <a:xfrm>
+            <a:off x="6251333" y="1727177"/>
+            <a:ext cx="1227024" cy="712233"/>
+            <a:chOff x="6395260" y="1936988"/>
+            <a:chExt cx="1089803" cy="632582"/>
+          </a:xfrm>
+        </p:grpSpPr>
+        <p:pic>
+          <p:nvPicPr>
+            <p:cNvPr id="20" name="Shape 186"/>
+            <p:cNvPicPr preferRelativeResize="0"/>
+            <p:nvPr/>
+          </p:nvPicPr>
+          <p:blipFill rotWithShape="1">
+            <a:blip r:embed="rId3">
+              <a:alphaModFix/>
+            </a:blip>
+            <a:srcRect t="4598" r="6933"/>
+            <a:stretch/>
+          </p:blipFill>
+          <p:spPr>
+            <a:xfrm>
+              <a:off x="6395260" y="1936988"/>
+              <a:ext cx="654071" cy="632582"/>
+            </a:xfrm>
+            <a:prstGeom prst="rect">
+              <a:avLst/>
+            </a:prstGeom>
+            <a:noFill/>
+            <a:ln>
+              <a:noFill/>
+            </a:ln>
+          </p:spPr>
+        </p:pic>
+        <p:sp>
+          <p:nvSpPr>
+            <p:cNvPr id="22" name="TextBox 21"/>
+            <p:cNvSpPr txBox="1"/>
+            <p:nvPr/>
+          </p:nvSpPr>
+          <p:spPr>
+            <a:xfrm>
+              <a:off x="6983966" y="2232217"/>
+              <a:ext cx="501097" cy="261610"/>
+            </a:xfrm>
+            <a:prstGeom prst="rect">
+              <a:avLst/>
+            </a:prstGeom>
+            <a:noFill/>
+          </p:spPr>
+          <p:txBody>
+            <a:bodyPr wrap="square" rtlCol="0">
+              <a:spAutoFit/>
+            </a:bodyPr>
+            <a:lstStyle/>
+            <a:p>
+              <a:r>
+                <a:rPr lang="en-US" sz="1050" dirty="0" smtClean="0"/>
+                <a:t>25%</a:t>
+              </a:r>
+              <a:endParaRPr lang="en-US" sz="1050" dirty="0"/>
+            </a:p>
+          </p:txBody>
+        </p:sp>
+      </p:grpSp>
+      <p:sp>
+        <p:nvSpPr>
+          <p:cNvPr id="16" name="Shape 182"/>
+          <p:cNvSpPr/>
+          <p:nvPr/>
+        </p:nvSpPr>
+        <p:spPr>
+          <a:xfrm>
+            <a:off x="5799336" y="2601151"/>
+            <a:ext cx="2033591" cy="1748770"/>
+          </a:xfrm>
+          <a:prstGeom prst="rect">
+            <a:avLst/>
+          </a:prstGeom>
+          <a:solidFill>
+            <a:schemeClr val="lt2"/>
+          </a:solidFill>
+          <a:ln w="9525" cap="flat" cmpd="sng">
+            <a:solidFill>
+              <a:schemeClr val="dk2"/>
+            </a:solidFill>
+            <a:prstDash val="solid"/>
+            <a:round/>
+            <a:headEnd type="none" w="med" len="med"/>
+            <a:tailEnd type="none" w="med" len="med"/>
+          </a:ln>
+        </p:spPr>
+        <p:txBody>
+          <a:bodyPr spcFirstLastPara="1" wrap="square" lIns="91425" tIns="91425" rIns="91425" bIns="91425" anchor="ctr" anchorCtr="0">
+            <a:noAutofit/>
+          </a:bodyPr>
+          <a:lstStyle/>
+          <a:p>
+            <a:pPr marL="0" lvl="0" indent="0" rtl="0">
+              <a:spcBef>
+                <a:spcPts val="0"/>
+              </a:spcBef>
+              <a:spcAft>
+                <a:spcPts val="0"/>
+              </a:spcAft>
+              <a:buNone/>
+            </a:pPr>
+            <a:endParaRPr sz="800"/>
+          </a:p>
+        </p:txBody>
+      </p:sp>
+      <p:pic>
+        <p:nvPicPr>
+          <p:cNvPr id="17" name="Shape 183" descr="context_004.jpg"/>
+          <p:cNvPicPr preferRelativeResize="0"/>
+          <p:nvPr/>
+        </p:nvPicPr>
+        <p:blipFill>
+          <a:blip r:embed="rId2">
+            <a:alphaModFix/>
+          </a:blip>
+          <a:stretch>
+            <a:fillRect/>
+          </a:stretch>
+        </p:blipFill>
+        <p:spPr>
+          <a:xfrm>
+            <a:off x="6316850" y="2999618"/>
+            <a:ext cx="998563" cy="951835"/>
+          </a:xfrm>
+          <a:prstGeom prst="rect">
+            <a:avLst/>
+          </a:prstGeom>
+          <a:noFill/>
+          <a:ln w="38100" cmpd="sng">
+            <a:solidFill>
+              <a:schemeClr val="accent5">
+                <a:lumMod val="60000"/>
+                <a:lumOff val="40000"/>
+              </a:schemeClr>
+            </a:solidFill>
+          </a:ln>
+        </p:spPr>
+      </p:pic>
+      <p:pic>
+        <p:nvPicPr>
+          <p:cNvPr id="19" name="Shape 185" descr="item_004.jpg"/>
+          <p:cNvPicPr preferRelativeResize="0"/>
+          <p:nvPr/>
+        </p:nvPicPr>
+        <p:blipFill>
+          <a:blip r:embed="rId4">
+            <a:alphaModFix/>
+          </a:blip>
+          <a:stretch>
+            <a:fillRect/>
+          </a:stretch>
+        </p:blipFill>
+        <p:spPr>
+          <a:xfrm>
+            <a:off x="6669753" y="3302913"/>
+            <a:ext cx="292760" cy="345247"/>
+          </a:xfrm>
+          <a:prstGeom prst="rect">
+            <a:avLst/>
+          </a:prstGeom>
+          <a:noFill/>
+          <a:ln>
+            <a:noFill/>
+          </a:ln>
+        </p:spPr>
+      </p:pic>
+      <p:sp>
+        <p:nvSpPr>
+          <p:cNvPr id="32" name="TextBox 31"/>
+          <p:cNvSpPr txBox="1"/>
+          <p:nvPr/>
+        </p:nvSpPr>
+        <p:spPr>
+          <a:xfrm>
+            <a:off x="6462140" y="4349921"/>
+            <a:ext cx="707130" cy="253916"/>
+          </a:xfrm>
+          <a:prstGeom prst="rect">
+            <a:avLst/>
+          </a:prstGeom>
+          <a:noFill/>
+        </p:spPr>
+        <p:txBody>
+          <a:bodyPr wrap="square" rtlCol="0">
+            <a:spAutoFit/>
+          </a:bodyPr>
+          <a:lstStyle/>
+          <a:p>
+            <a:pPr algn="ctr"/>
+            <a:r>
+              <a:rPr lang="en-US" sz="1050" dirty="0" smtClean="0"/>
+              <a:t>2 </a:t>
+            </a:r>
+            <a:r>
+              <a:rPr lang="en-US" sz="1050" dirty="0" smtClean="0"/>
+              <a:t>sec</a:t>
+            </a:r>
+            <a:endParaRPr lang="en-US" sz="1050" dirty="0"/>
+          </a:p>
+        </p:txBody>
+      </p:sp>
+      <p:sp>
+        <p:nvSpPr>
+          <p:cNvPr id="34" name="TextBox 33"/>
+          <p:cNvSpPr txBox="1"/>
+          <p:nvPr/>
+        </p:nvSpPr>
+        <p:spPr>
+          <a:xfrm rot="1891962">
+            <a:off x="7901750" y="4154434"/>
+            <a:ext cx="437911" cy="450490"/>
+          </a:xfrm>
+          <a:prstGeom prst="rect">
+            <a:avLst/>
+          </a:prstGeom>
+          <a:noFill/>
+        </p:spPr>
+        <p:txBody>
+          <a:bodyPr wrap="square" rtlCol="0" anchor="ctr">
+            <a:spAutoFit/>
+          </a:bodyPr>
+          <a:lstStyle/>
+          <a:p>
+            <a:pPr algn="dist"/>
+            <a:r>
+              <a:rPr lang="is-IS" sz="2000" dirty="0" smtClean="0"/>
+              <a:t>…</a:t>
+            </a:r>
+            <a:endParaRPr lang="en-US" sz="2000" dirty="0"/>
+          </a:p>
+        </p:txBody>
+      </p:sp>
+      <p:sp>
+        <p:nvSpPr>
+          <p:cNvPr id="15" name="Rectangle 14"/>
+          <p:cNvSpPr/>
+          <p:nvPr/>
+        </p:nvSpPr>
+        <p:spPr>
+          <a:xfrm>
+            <a:off x="1519087" y="1103313"/>
+            <a:ext cx="385913" cy="341312"/>
+          </a:xfrm>
+          <a:prstGeom prst="rect">
+            <a:avLst/>
+          </a:prstGeom>
+          <a:solidFill>
+            <a:schemeClr val="accent5">
+              <a:lumMod val="60000"/>
+              <a:lumOff val="40000"/>
+            </a:schemeClr>
+          </a:solidFill>
+          <a:ln>
+            <a:solidFill>
+              <a:srgbClr val="31EBFF"/>
+            </a:solidFill>
+          </a:ln>
+        </p:spPr>
+        <p:style>
+          <a:lnRef idx="1">
+            <a:schemeClr val="accent1"/>
+          </a:lnRef>
+          <a:fillRef idx="3">
+            <a:schemeClr val="accent1"/>
+          </a:fillRef>
+          <a:effectRef idx="2">
+            <a:schemeClr val="accent1"/>
+          </a:effectRef>
+          <a:fontRef idx="minor">
+            <a:schemeClr val="lt1"/>
+          </a:fontRef>
+        </p:style>
+        <p:txBody>
+          <a:bodyPr rtlCol="0" anchor="ctr"/>
+          <a:lstStyle/>
+          <a:p>
+            <a:pPr algn="ctr"/>
+            <a:r>
+              <a:rPr lang="en-US" sz="400" b="1" dirty="0" smtClean="0">
+                <a:solidFill>
+                  <a:schemeClr val="tx1"/>
+                </a:solidFill>
+              </a:rPr>
+              <a:t>BOMBS</a:t>
+            </a:r>
+            <a:endParaRPr lang="en-US" sz="400" b="1" dirty="0">
+              <a:solidFill>
+                <a:schemeClr val="tx1"/>
+              </a:solidFill>
+            </a:endParaRPr>
+          </a:p>
+        </p:txBody>
+      </p:sp>
+      <p:sp>
+        <p:nvSpPr>
+          <p:cNvPr id="33" name="Rectangle 32"/>
+          <p:cNvSpPr/>
+          <p:nvPr/>
+        </p:nvSpPr>
+        <p:spPr>
+          <a:xfrm>
+            <a:off x="1519087" y="1556521"/>
+            <a:ext cx="385913" cy="341312"/>
+          </a:xfrm>
+          <a:prstGeom prst="rect">
+            <a:avLst/>
+          </a:prstGeom>
+        </p:spPr>
+        <p:style>
+          <a:lnRef idx="1">
+            <a:schemeClr val="accent6"/>
+          </a:lnRef>
+          <a:fillRef idx="3">
+            <a:schemeClr val="accent6"/>
+          </a:fillRef>
+          <a:effectRef idx="2">
+            <a:schemeClr val="accent6"/>
+          </a:effectRef>
+          <a:fontRef idx="minor">
+            <a:schemeClr val="lt1"/>
+          </a:fontRef>
+        </p:style>
+        <p:txBody>
+          <a:bodyPr rtlCol="0" anchor="ctr"/>
+          <a:lstStyle/>
+          <a:p>
+            <a:pPr algn="ctr"/>
+            <a:r>
+              <a:rPr lang="en-US" sz="400" b="1" dirty="0" smtClean="0">
+                <a:solidFill>
+                  <a:srgbClr val="000000"/>
+                </a:solidFill>
+              </a:rPr>
+              <a:t>SAFETY</a:t>
+            </a:r>
+            <a:endParaRPr lang="en-US" sz="400" b="1" dirty="0">
+              <a:solidFill>
+                <a:srgbClr val="000000"/>
+              </a:solidFill>
+            </a:endParaRPr>
+          </a:p>
+        </p:txBody>
+      </p:sp>
+      <p:sp>
+        <p:nvSpPr>
+          <p:cNvPr id="2" name="TextBox 1"/>
+          <p:cNvSpPr txBox="1"/>
+          <p:nvPr/>
+        </p:nvSpPr>
+        <p:spPr>
+          <a:xfrm>
+            <a:off x="2788861" y="1357313"/>
+            <a:ext cx="1199951" cy="200055"/>
+          </a:xfrm>
+          <a:prstGeom prst="rect">
+            <a:avLst/>
+          </a:prstGeom>
+          <a:noFill/>
+        </p:spPr>
+        <p:txBody>
+          <a:bodyPr wrap="square" rtlCol="0">
+            <a:spAutoFit/>
+          </a:bodyPr>
+          <a:lstStyle/>
+          <a:p>
+            <a:pPr algn="ctr"/>
+            <a:r>
+              <a:rPr lang="en-US" sz="700" b="1" dirty="0" smtClean="0"/>
+              <a:t>WARNING: BOMBS!</a:t>
+            </a:r>
+            <a:endParaRPr lang="en-US" sz="700" b="1" dirty="0"/>
+          </a:p>
+        </p:txBody>
+      </p:sp>
+      <p:sp>
+        <p:nvSpPr>
+          <p:cNvPr id="3" name="Connector 2"/>
+          <p:cNvSpPr/>
+          <p:nvPr/>
+        </p:nvSpPr>
+        <p:spPr>
+          <a:xfrm>
+            <a:off x="5056188" y="2770945"/>
+            <a:ext cx="71438" cy="73152"/>
+          </a:xfrm>
+          <a:prstGeom prst="flowChartConnector">
+            <a:avLst/>
+          </a:prstGeom>
+          <a:solidFill>
+            <a:schemeClr val="bg1"/>
+          </a:solidFill>
+          <a:ln>
+            <a:noFill/>
+          </a:ln>
+        </p:spPr>
+        <p:style>
+          <a:lnRef idx="1">
+            <a:schemeClr val="accent1"/>
+          </a:lnRef>
+          <a:fillRef idx="3">
+            <a:schemeClr val="accent1"/>
+          </a:fillRef>
+          <a:effectRef idx="2">
+            <a:schemeClr val="accent1"/>
+          </a:effectRef>
+          <a:fontRef idx="minor">
+            <a:schemeClr val="lt1"/>
+          </a:fontRef>
+        </p:style>
+        <p:txBody>
+          <a:bodyPr rtlCol="0" anchor="ctr"/>
+          <a:lstStyle/>
+          <a:p>
+            <a:pPr algn="ctr"/>
+            <a:endParaRPr lang="en-US">
+              <a:solidFill>
+                <a:schemeClr val="tx1"/>
+              </a:solidFill>
+            </a:endParaRPr>
+          </a:p>
+        </p:txBody>
+      </p:sp>
     </p:spTree>
     <p:extLst>
       <p:ext uri="{BB962C8B-B14F-4D97-AF65-F5344CB8AC3E}">

</xml_diff>

<commit_message>
Compressed ROIs; updated figure pic
</commit_message>
<xml_diff>
--- a/figs/encoding-trial-overview.pptx
+++ b/figs/encoding-trial-overview.pptx
@@ -214,6 +214,22 @@
       </a:defRPr>
     </a:lvl9pPr>
   </p:defaultTextStyle>
+  <p:extLst>
+    <p:ext uri="{EFAFB233-063F-42B5-8137-9DF3F51BA10A}">
+      <p15:sldGuideLst xmlns:p15="http://schemas.microsoft.com/office/powerpoint/2012/main">
+        <p15:guide id="1" orient="horz" pos="1620">
+          <p15:clr>
+            <a:srgbClr val="A4A3A4"/>
+          </p15:clr>
+        </p15:guide>
+        <p15:guide id="2" pos="2880">
+          <p15:clr>
+            <a:srgbClr val="A4A3A4"/>
+          </p15:clr>
+        </p15:guide>
+      </p15:sldGuideLst>
+    </p:ext>
+  </p:extLst>
 </p:presentation>
 </file>
 
@@ -3905,11 +3921,7 @@
               <a:pPr algn="ctr"/>
               <a:r>
                 <a:rPr lang="en-US" sz="1050" dirty="0" smtClean="0"/>
-                <a:t>4 </a:t>
-              </a:r>
-              <a:r>
-                <a:rPr lang="en-US" sz="1050" dirty="0" smtClean="0"/>
-                <a:t>sec</a:t>
+                <a:t>4 sec</a:t>
               </a:r>
               <a:endParaRPr lang="en-US" sz="1050" dirty="0"/>
             </a:p>
@@ -4158,7 +4170,6 @@
               <a:rPr lang="en-US" sz="1050" dirty="0"/>
               <a:t>[2, 4, 6, 8] sec</a:t>
             </a:r>
-            <a:endParaRPr lang="en-US" sz="1050" dirty="0"/>
           </a:p>
         </p:txBody>
       </p:sp>
@@ -4170,7 +4181,7 @@
         </p:nvGrpSpPr>
         <p:grpSpPr>
           <a:xfrm>
-            <a:off x="6251333" y="1727177"/>
+            <a:off x="6316850" y="1727177"/>
             <a:ext cx="1227024" cy="712233"/>
             <a:chOff x="6395260" y="1936988"/>
             <a:chExt cx="1089803" cy="632582"/>
@@ -4366,11 +4377,7 @@
             <a:pPr algn="ctr"/>
             <a:r>
               <a:rPr lang="en-US" sz="1050" dirty="0" smtClean="0"/>
-              <a:t>2 </a:t>
-            </a:r>
-            <a:r>
-              <a:rPr lang="en-US" sz="1050" dirty="0" smtClean="0"/>
-              <a:t>sec</a:t>
+              <a:t>2 sec</a:t>
             </a:r>
             <a:endParaRPr lang="en-US" sz="1050" dirty="0"/>
           </a:p>
@@ -4610,7 +4617,7 @@
   <p:timing>
     <p:tnLst>
       <p:par>
-        <p:cTn xmlns:p14="http://schemas.microsoft.com/office/powerpoint/2010/main" id="1" dur="indefinite" restart="never" nodeType="tmRoot"/>
+        <p:cTn id="1" dur="indefinite" restart="never" nodeType="tmRoot"/>
       </p:par>
     </p:tnLst>
   </p:timing>

</xml_diff>